<commit_message>
[Docs] Fixed Midterm pptx
</commit_message>
<xml_diff>
--- a/Presentations/Midterm-TCPs.pptx
+++ b/Presentations/Midterm-TCPs.pptx
@@ -5,18 +5,19 @@
     <p:sldMasterId id="2147483648" r:id="rId1"/>
   </p:sldMasterIdLst>
   <p:notesMasterIdLst>
-    <p:notesMasterId r:id="rId11"/>
+    <p:notesMasterId r:id="rId12"/>
   </p:notesMasterIdLst>
   <p:sldIdLst>
     <p:sldId id="256" r:id="rId2"/>
     <p:sldId id="270" r:id="rId3"/>
     <p:sldId id="269" r:id="rId4"/>
-    <p:sldId id="275" r:id="rId5"/>
-    <p:sldId id="276" r:id="rId6"/>
-    <p:sldId id="277" r:id="rId7"/>
-    <p:sldId id="278" r:id="rId8"/>
-    <p:sldId id="271" r:id="rId9"/>
-    <p:sldId id="272" r:id="rId10"/>
+    <p:sldId id="276" r:id="rId5"/>
+    <p:sldId id="271" r:id="rId6"/>
+    <p:sldId id="279" r:id="rId7"/>
+    <p:sldId id="281" r:id="rId8"/>
+    <p:sldId id="275" r:id="rId9"/>
+    <p:sldId id="280" r:id="rId10"/>
+    <p:sldId id="272" r:id="rId11"/>
   </p:sldIdLst>
   <p:sldSz cx="12192000" cy="6858000"/>
   <p:notesSz cx="6858000" cy="9144000"/>
@@ -670,7 +671,7 @@
           <a:p>
             <a:fld id="{FAB9B78D-3E5E-564E-A601-8989A842ECCF}" type="slidenum">
               <a:rPr lang="en-KR" smtClean="0"/>
-              <a:t>8</a:t>
+              <a:t>5</a:t>
             </a:fld>
             <a:endParaRPr lang="en-KR"/>
           </a:p>
@@ -4078,6 +4079,80 @@
 </p:sld>
 </file>
 
+<file path=ppt/slides/slide10.xml><?xml version="1.0" encoding="utf-8"?>
+<p:sld xmlns:a="http://schemas.openxmlformats.org/drawingml/2006/main" xmlns:r="http://schemas.openxmlformats.org/officeDocument/2006/relationships" xmlns:p="http://schemas.openxmlformats.org/presentationml/2006/main">
+  <p:cSld>
+    <p:spTree>
+      <p:nvGrpSpPr>
+        <p:cNvPr id="1" name="">
+          <a:extLst>
+            <a:ext uri="{FF2B5EF4-FFF2-40B4-BE49-F238E27FC236}">
+              <a16:creationId xmlns:a16="http://schemas.microsoft.com/office/drawing/2014/main" id="{A0F33974-3058-FD8E-ABE0-7B10E1833833}"/>
+            </a:ext>
+          </a:extLst>
+        </p:cNvPr>
+        <p:cNvGrpSpPr/>
+        <p:nvPr/>
+      </p:nvGrpSpPr>
+      <p:grpSpPr>
+        <a:xfrm>
+          <a:off x="0" y="0"/>
+          <a:ext cx="0" cy="0"/>
+          <a:chOff x="0" y="0"/>
+          <a:chExt cx="0" cy="0"/>
+        </a:xfrm>
+      </p:grpSpPr>
+      <p:sp>
+        <p:nvSpPr>
+          <p:cNvPr id="8" name="TextBox 7">
+            <a:extLst>
+              <a:ext uri="{FF2B5EF4-FFF2-40B4-BE49-F238E27FC236}">
+                <a16:creationId xmlns:a16="http://schemas.microsoft.com/office/drawing/2014/main" id="{EBA30D0E-D0AD-48C1-C7EB-552439655DC3}"/>
+              </a:ext>
+            </a:extLst>
+          </p:cNvPr>
+          <p:cNvSpPr txBox="1"/>
+          <p:nvPr/>
+        </p:nvSpPr>
+        <p:spPr>
+          <a:xfrm>
+            <a:off x="2670048" y="3044279"/>
+            <a:ext cx="6851904" cy="769441"/>
+          </a:xfrm>
+          <a:prstGeom prst="rect">
+            <a:avLst/>
+          </a:prstGeom>
+          <a:noFill/>
+        </p:spPr>
+        <p:txBody>
+          <a:bodyPr wrap="square" rtlCol="0">
+            <a:spAutoFit/>
+          </a:bodyPr>
+          <a:lstStyle/>
+          <a:p>
+            <a:pPr algn="ctr"/>
+            <a:r>
+              <a:rPr lang="en-KR" sz="4400" b="1" dirty="0">
+                <a:latin typeface="Avenir Next LT Pro" panose="020B0504020202020204" pitchFamily="34" charset="77"/>
+              </a:rPr>
+              <a:t>Thanks for Listening!</a:t>
+            </a:r>
+          </a:p>
+        </p:txBody>
+      </p:sp>
+    </p:spTree>
+    <p:extLst>
+      <p:ext uri="{BB962C8B-B14F-4D97-AF65-F5344CB8AC3E}">
+        <p14:creationId xmlns:p14="http://schemas.microsoft.com/office/powerpoint/2010/main" val="2587172812"/>
+      </p:ext>
+    </p:extLst>
+  </p:cSld>
+  <p:clrMapOvr>
+    <a:masterClrMapping/>
+  </p:clrMapOvr>
+</p:sld>
+</file>
+
 <file path=ppt/slides/slide2.xml><?xml version="1.0" encoding="utf-8"?>
 <p:sld xmlns:a="http://schemas.openxmlformats.org/drawingml/2006/main" xmlns:r="http://schemas.openxmlformats.org/officeDocument/2006/relationships" xmlns:p="http://schemas.openxmlformats.org/presentationml/2006/main">
   <p:cSld>
@@ -4883,207 +4958,6 @@
   <p:cSld>
     <p:spTree>
       <p:nvGrpSpPr>
-        <p:cNvPr id="1" name="">
-          <a:extLst>
-            <a:ext uri="{FF2B5EF4-FFF2-40B4-BE49-F238E27FC236}">
-              <a16:creationId xmlns:a16="http://schemas.microsoft.com/office/drawing/2014/main" id="{EC746D0F-4896-FD57-0288-267EA0C4106E}"/>
-            </a:ext>
-          </a:extLst>
-        </p:cNvPr>
-        <p:cNvGrpSpPr/>
-        <p:nvPr/>
-      </p:nvGrpSpPr>
-      <p:grpSpPr>
-        <a:xfrm>
-          <a:off x="0" y="0"/>
-          <a:ext cx="0" cy="0"/>
-          <a:chOff x="0" y="0"/>
-          <a:chExt cx="0" cy="0"/>
-        </a:xfrm>
-      </p:grpSpPr>
-      <p:sp>
-        <p:nvSpPr>
-          <p:cNvPr id="2" name="Title 1">
-            <a:extLst>
-              <a:ext uri="{FF2B5EF4-FFF2-40B4-BE49-F238E27FC236}">
-                <a16:creationId xmlns:a16="http://schemas.microsoft.com/office/drawing/2014/main" id="{50F29B50-638B-2276-F847-51546D59FDA5}"/>
-              </a:ext>
-            </a:extLst>
-          </p:cNvPr>
-          <p:cNvSpPr>
-            <a:spLocks noGrp="1"/>
-          </p:cNvSpPr>
-          <p:nvPr>
-            <p:ph type="title"/>
-          </p:nvPr>
-        </p:nvSpPr>
-        <p:spPr/>
-        <p:txBody>
-          <a:bodyPr/>
-          <a:lstStyle/>
-          <a:p>
-            <a:r>
-              <a:rPr lang="en-US" b="1" dirty="0">
-                <a:latin typeface="Avenir Next LT Pro" panose="020B0504020202020204" pitchFamily="34" charset="77"/>
-              </a:rPr>
-              <a:t>Basic</a:t>
-            </a:r>
-            <a:r>
-              <a:rPr lang="ko-KR" altLang="en-US" b="1" dirty="0">
-                <a:latin typeface="Avenir Next LT Pro" panose="020B0504020202020204" pitchFamily="34" charset="77"/>
-              </a:rPr>
-              <a:t> </a:t>
-            </a:r>
-            <a:r>
-              <a:rPr lang="en-US" altLang="ko-KR" b="1" dirty="0">
-                <a:latin typeface="Avenir Next LT Pro" panose="020B0504020202020204" pitchFamily="34" charset="77"/>
-              </a:rPr>
-              <a:t>UI</a:t>
-            </a:r>
-            <a:endParaRPr lang="en-KR" b="1" dirty="0">
-              <a:latin typeface="Avenir Next LT Pro" panose="020B0504020202020204" pitchFamily="34" charset="77"/>
-            </a:endParaRPr>
-          </a:p>
-        </p:txBody>
-      </p:sp>
-      <p:pic>
-        <p:nvPicPr>
-          <p:cNvPr id="12" name="그림 11">
-            <a:extLst>
-              <a:ext uri="{FF2B5EF4-FFF2-40B4-BE49-F238E27FC236}">
-                <a16:creationId xmlns:a16="http://schemas.microsoft.com/office/drawing/2014/main" id="{C99254BA-6F4B-CCB5-C71B-A1D73D78884F}"/>
-              </a:ext>
-            </a:extLst>
-          </p:cNvPr>
-          <p:cNvPicPr>
-            <a:picLocks noChangeAspect="1"/>
-          </p:cNvPicPr>
-          <p:nvPr/>
-        </p:nvPicPr>
-        <p:blipFill>
-          <a:blip r:embed="rId2"/>
-          <a:stretch>
-            <a:fillRect/>
-          </a:stretch>
-        </p:blipFill>
-        <p:spPr>
-          <a:xfrm>
-            <a:off x="1659477" y="1988820"/>
-            <a:ext cx="1696916" cy="3600000"/>
-          </a:xfrm>
-          <a:prstGeom prst="rect">
-            <a:avLst/>
-          </a:prstGeom>
-        </p:spPr>
-      </p:pic>
-      <p:pic>
-        <p:nvPicPr>
-          <p:cNvPr id="14" name="그림 13">
-            <a:extLst>
-              <a:ext uri="{FF2B5EF4-FFF2-40B4-BE49-F238E27FC236}">
-                <a16:creationId xmlns:a16="http://schemas.microsoft.com/office/drawing/2014/main" id="{33A6F238-0829-6232-D3B2-B0F0AEA9A261}"/>
-              </a:ext>
-            </a:extLst>
-          </p:cNvPr>
-          <p:cNvPicPr>
-            <a:picLocks noChangeAspect="1"/>
-          </p:cNvPicPr>
-          <p:nvPr/>
-        </p:nvPicPr>
-        <p:blipFill>
-          <a:blip r:embed="rId3"/>
-          <a:stretch>
-            <a:fillRect/>
-          </a:stretch>
-        </p:blipFill>
-        <p:spPr>
-          <a:xfrm>
-            <a:off x="8817087" y="1988820"/>
-            <a:ext cx="1696916" cy="3600000"/>
-          </a:xfrm>
-          <a:prstGeom prst="rect">
-            <a:avLst/>
-          </a:prstGeom>
-        </p:spPr>
-      </p:pic>
-      <p:pic>
-        <p:nvPicPr>
-          <p:cNvPr id="16" name="그림 15">
-            <a:extLst>
-              <a:ext uri="{FF2B5EF4-FFF2-40B4-BE49-F238E27FC236}">
-                <a16:creationId xmlns:a16="http://schemas.microsoft.com/office/drawing/2014/main" id="{442D3C68-B237-9012-0E0D-BACC2BAA54EB}"/>
-              </a:ext>
-            </a:extLst>
-          </p:cNvPr>
-          <p:cNvPicPr>
-            <a:picLocks noChangeAspect="1"/>
-          </p:cNvPicPr>
-          <p:nvPr/>
-        </p:nvPicPr>
-        <p:blipFill>
-          <a:blip r:embed="rId4"/>
-          <a:stretch>
-            <a:fillRect/>
-          </a:stretch>
-        </p:blipFill>
-        <p:spPr>
-          <a:xfrm>
-            <a:off x="6431217" y="1988820"/>
-            <a:ext cx="1696916" cy="3600000"/>
-          </a:xfrm>
-          <a:prstGeom prst="rect">
-            <a:avLst/>
-          </a:prstGeom>
-        </p:spPr>
-      </p:pic>
-      <p:pic>
-        <p:nvPicPr>
-          <p:cNvPr id="18" name="그림 17">
-            <a:extLst>
-              <a:ext uri="{FF2B5EF4-FFF2-40B4-BE49-F238E27FC236}">
-                <a16:creationId xmlns:a16="http://schemas.microsoft.com/office/drawing/2014/main" id="{AE3DB46D-4068-6677-6813-F41D425AB394}"/>
-              </a:ext>
-            </a:extLst>
-          </p:cNvPr>
-          <p:cNvPicPr>
-            <a:picLocks noChangeAspect="1"/>
-          </p:cNvPicPr>
-          <p:nvPr/>
-        </p:nvPicPr>
-        <p:blipFill>
-          <a:blip r:embed="rId5"/>
-          <a:stretch>
-            <a:fillRect/>
-          </a:stretch>
-        </p:blipFill>
-        <p:spPr>
-          <a:xfrm>
-            <a:off x="4045347" y="1988820"/>
-            <a:ext cx="1696916" cy="3600000"/>
-          </a:xfrm>
-          <a:prstGeom prst="rect">
-            <a:avLst/>
-          </a:prstGeom>
-        </p:spPr>
-      </p:pic>
-    </p:spTree>
-    <p:extLst>
-      <p:ext uri="{BB962C8B-B14F-4D97-AF65-F5344CB8AC3E}">
-        <p14:creationId xmlns:p14="http://schemas.microsoft.com/office/powerpoint/2010/main" val="3293891069"/>
-      </p:ext>
-    </p:extLst>
-  </p:cSld>
-  <p:clrMapOvr>
-    <a:masterClrMapping/>
-  </p:clrMapOvr>
-</p:sld>
-</file>
-
-<file path=ppt/slides/slide5.xml><?xml version="1.0" encoding="utf-8"?>
-<p:sld xmlns:a="http://schemas.openxmlformats.org/drawingml/2006/main" xmlns:r="http://schemas.openxmlformats.org/officeDocument/2006/relationships" xmlns:p="http://schemas.openxmlformats.org/presentationml/2006/main">
-  <p:cSld>
-    <p:spTree>
-      <p:nvGrpSpPr>
         <p:cNvPr id="1" name=""/>
         <p:cNvGrpSpPr/>
         <p:nvPr/>
@@ -5131,6 +5005,224 @@
             <a:endParaRPr lang="en-KR" b="1" dirty="0">
               <a:latin typeface="Avenir Next LT Pro" panose="020B0504020202020204" pitchFamily="34" charset="77"/>
             </a:endParaRPr>
+          </a:p>
+        </p:txBody>
+      </p:sp>
+      <p:sp>
+        <p:nvSpPr>
+          <p:cNvPr id="2" name="TextBox 1">
+            <a:extLst>
+              <a:ext uri="{FF2B5EF4-FFF2-40B4-BE49-F238E27FC236}">
+                <a16:creationId xmlns:a16="http://schemas.microsoft.com/office/drawing/2014/main" id="{44B100E6-0260-2602-2278-1011F2B98FBF}"/>
+              </a:ext>
+            </a:extLst>
+          </p:cNvPr>
+          <p:cNvSpPr txBox="1"/>
+          <p:nvPr/>
+        </p:nvSpPr>
+        <p:spPr>
+          <a:xfrm>
+            <a:off x="1203469" y="4247536"/>
+            <a:ext cx="5049847" cy="369332"/>
+          </a:xfrm>
+          <a:prstGeom prst="rect">
+            <a:avLst/>
+          </a:prstGeom>
+          <a:noFill/>
+        </p:spPr>
+        <p:txBody>
+          <a:bodyPr wrap="square" rtlCol="0">
+            <a:spAutoFit/>
+          </a:bodyPr>
+          <a:lstStyle/>
+          <a:p>
+            <a:r>
+              <a:rPr lang="ko-KR" altLang="en-US" dirty="0"/>
+              <a:t>전체적인 구현 </a:t>
+            </a:r>
+            <a:r>
+              <a:rPr lang="en-US" altLang="ko-KR" dirty="0"/>
+              <a:t>&amp; Haptic </a:t>
+            </a:r>
+            <a:r>
+              <a:rPr lang="ko-KR" altLang="en-US" dirty="0"/>
+              <a:t>설명</a:t>
+            </a:r>
+          </a:p>
+        </p:txBody>
+      </p:sp>
+      <p:sp>
+        <p:nvSpPr>
+          <p:cNvPr id="3" name="TextBox 2">
+            <a:extLst>
+              <a:ext uri="{FF2B5EF4-FFF2-40B4-BE49-F238E27FC236}">
+                <a16:creationId xmlns:a16="http://schemas.microsoft.com/office/drawing/2014/main" id="{B94D37D6-F8C9-3CBA-B5D2-C08639D6E1AB}"/>
+              </a:ext>
+            </a:extLst>
+          </p:cNvPr>
+          <p:cNvSpPr txBox="1"/>
+          <p:nvPr/>
+        </p:nvSpPr>
+        <p:spPr>
+          <a:xfrm>
+            <a:off x="1046153" y="1804220"/>
+            <a:ext cx="8440010" cy="1477328"/>
+          </a:xfrm>
+          <a:prstGeom prst="rect">
+            <a:avLst/>
+          </a:prstGeom>
+          <a:noFill/>
+        </p:spPr>
+        <p:txBody>
+          <a:bodyPr wrap="square" rtlCol="0">
+            <a:spAutoFit/>
+          </a:bodyPr>
+          <a:lstStyle/>
+          <a:p>
+            <a:r>
+              <a:rPr lang="ko-KR" altLang="en-US" dirty="0"/>
+              <a:t>발표 흐름</a:t>
+            </a:r>
+            <a:br>
+              <a:rPr lang="en-US" altLang="ko-KR" dirty="0"/>
+            </a:br>
+            <a:r>
+              <a:rPr lang="en-US" altLang="ko-KR" dirty="0"/>
+              <a:t>1. </a:t>
+            </a:r>
+            <a:r>
+              <a:rPr lang="ko-KR" altLang="en-US" dirty="0"/>
+              <a:t>지난 번에 우리가 </a:t>
+            </a:r>
+            <a:r>
+              <a:rPr lang="en-US" altLang="ko-KR" dirty="0"/>
+              <a:t>Haptic Fitness </a:t>
+            </a:r>
+            <a:r>
+              <a:rPr lang="ko-KR" altLang="en-US" dirty="0"/>
+              <a:t>한다고 했음</a:t>
+            </a:r>
+            <a:endParaRPr lang="en-US" altLang="ko-KR" dirty="0"/>
+          </a:p>
+          <a:p>
+            <a:r>
+              <a:rPr lang="en-US" altLang="ko-KR" dirty="0"/>
+              <a:t>2.</a:t>
+            </a:r>
+            <a:r>
+              <a:rPr lang="ko-KR" altLang="en-US" dirty="0"/>
+              <a:t> 그때 </a:t>
+            </a:r>
+            <a:r>
+              <a:rPr lang="ko-KR" altLang="en-US" dirty="0" err="1"/>
+              <a:t>햅틱에</a:t>
+            </a:r>
+            <a:r>
+              <a:rPr lang="ko-KR" altLang="en-US" dirty="0"/>
+              <a:t> 대해 </a:t>
+            </a:r>
+            <a:r>
+              <a:rPr lang="ko-KR" altLang="en-US" dirty="0" err="1"/>
+              <a:t>이렇게이렇게</a:t>
+            </a:r>
+            <a:r>
+              <a:rPr lang="ko-KR" altLang="en-US" dirty="0"/>
+              <a:t> 적용하겠다 했는데 그래서 </a:t>
+            </a:r>
+            <a:r>
+              <a:rPr lang="ko-KR" altLang="en-US" dirty="0" err="1"/>
+              <a:t>구현한거</a:t>
+            </a:r>
+            <a:r>
+              <a:rPr lang="ko-KR" altLang="en-US" dirty="0"/>
+              <a:t> 설명함</a:t>
+            </a:r>
+            <a:endParaRPr lang="en-US" altLang="ko-KR" dirty="0"/>
+          </a:p>
+          <a:p>
+            <a:r>
+              <a:rPr lang="en-US" altLang="ko-KR" dirty="0"/>
+              <a:t>3. </a:t>
+            </a:r>
+            <a:r>
+              <a:rPr lang="ko-KR" altLang="en-US" dirty="0"/>
+              <a:t>구현 설명 끝나면 실제 예시 </a:t>
+            </a:r>
+            <a:r>
+              <a:rPr lang="en-US" altLang="ko-KR" dirty="0"/>
+              <a:t>(</a:t>
+            </a:r>
+            <a:r>
+              <a:rPr lang="ko-KR" altLang="en-US" dirty="0" err="1"/>
+              <a:t>허리피기</a:t>
+            </a:r>
+            <a:r>
+              <a:rPr lang="ko-KR" altLang="en-US" dirty="0"/>
+              <a:t> </a:t>
+            </a:r>
+            <a:r>
+              <a:rPr lang="ko-KR" altLang="en-US" dirty="0" err="1"/>
+              <a:t>만든거</a:t>
+            </a:r>
+            <a:r>
+              <a:rPr lang="en-US" altLang="ko-KR" dirty="0"/>
+              <a:t>) </a:t>
+            </a:r>
+            <a:r>
+              <a:rPr lang="ko-KR" altLang="en-US" dirty="0"/>
+              <a:t>보여주거나 직접 시키며 소개</a:t>
+            </a:r>
+            <a:endParaRPr lang="en-US" altLang="ko-KR" dirty="0"/>
+          </a:p>
+          <a:p>
+            <a:r>
+              <a:rPr lang="en-US" altLang="ko-KR" dirty="0"/>
+              <a:t>4. Next Plan (</a:t>
+            </a:r>
+            <a:r>
+              <a:rPr lang="ko-KR" altLang="en-US" dirty="0"/>
+              <a:t>앞으로 할 것들</a:t>
+            </a:r>
+            <a:r>
+              <a:rPr lang="en-US" altLang="ko-KR" dirty="0"/>
+              <a:t>) – </a:t>
+            </a:r>
+            <a:r>
+              <a:rPr lang="ko-KR" altLang="en-US" dirty="0"/>
+              <a:t>이 때 </a:t>
+            </a:r>
+            <a:r>
+              <a:rPr lang="en-US" altLang="ko-KR" dirty="0"/>
+              <a:t>Activity </a:t>
+            </a:r>
+            <a:r>
+              <a:rPr lang="ko-KR" altLang="en-US" dirty="0"/>
+              <a:t>추가 </a:t>
+            </a:r>
+            <a:r>
+              <a:rPr lang="en-US" altLang="ko-KR" dirty="0"/>
+              <a:t>/ UI </a:t>
+            </a:r>
+            <a:r>
+              <a:rPr lang="ko-KR" altLang="en-US" dirty="0"/>
+              <a:t>개선 </a:t>
+            </a:r>
+            <a:r>
+              <a:rPr lang="en-US" altLang="ko-KR" dirty="0"/>
+              <a:t>/ </a:t>
+            </a:r>
+            <a:r>
+              <a:rPr lang="ko-KR" altLang="en-US" dirty="0"/>
+              <a:t>음악 도입</a:t>
+            </a:r>
+            <a:r>
+              <a:rPr lang="en-US" altLang="ko-KR" dirty="0"/>
+              <a:t>? </a:t>
+            </a:r>
+            <a:r>
+              <a:rPr lang="ko-KR" altLang="en-US" dirty="0"/>
+              <a:t>설명 예정</a:t>
+            </a:r>
           </a:p>
         </p:txBody>
       </p:sp>
@@ -5147,155 +5239,7 @@
 </p:sld>
 </file>
 
-<file path=ppt/slides/slide6.xml><?xml version="1.0" encoding="utf-8"?>
-<p:sld xmlns:a="http://schemas.openxmlformats.org/drawingml/2006/main" xmlns:r="http://schemas.openxmlformats.org/officeDocument/2006/relationships" xmlns:p="http://schemas.openxmlformats.org/presentationml/2006/main">
-  <p:cSld>
-    <p:spTree>
-      <p:nvGrpSpPr>
-        <p:cNvPr id="1" name="">
-          <a:extLst>
-            <a:ext uri="{FF2B5EF4-FFF2-40B4-BE49-F238E27FC236}">
-              <a16:creationId xmlns:a16="http://schemas.microsoft.com/office/drawing/2014/main" id="{4462C46C-8C66-873C-77AB-74FF6F4E98E0}"/>
-            </a:ext>
-          </a:extLst>
-        </p:cNvPr>
-        <p:cNvGrpSpPr/>
-        <p:nvPr/>
-      </p:nvGrpSpPr>
-      <p:grpSpPr>
-        <a:xfrm>
-          <a:off x="0" y="0"/>
-          <a:ext cx="0" cy="0"/>
-          <a:chOff x="0" y="0"/>
-          <a:chExt cx="0" cy="0"/>
-        </a:xfrm>
-      </p:grpSpPr>
-      <p:sp>
-        <p:nvSpPr>
-          <p:cNvPr id="4" name="Title 1">
-            <a:extLst>
-              <a:ext uri="{FF2B5EF4-FFF2-40B4-BE49-F238E27FC236}">
-                <a16:creationId xmlns:a16="http://schemas.microsoft.com/office/drawing/2014/main" id="{7B084534-1D2C-49B4-D6AD-48EFC4F0A53B}"/>
-              </a:ext>
-            </a:extLst>
-          </p:cNvPr>
-          <p:cNvSpPr>
-            <a:spLocks noGrp="1"/>
-          </p:cNvSpPr>
-          <p:nvPr>
-            <p:ph type="title"/>
-          </p:nvPr>
-        </p:nvSpPr>
-        <p:spPr>
-          <a:xfrm>
-            <a:off x="838200" y="365125"/>
-            <a:ext cx="10515600" cy="1325563"/>
-          </a:xfrm>
-        </p:spPr>
-        <p:txBody>
-          <a:bodyPr/>
-          <a:lstStyle/>
-          <a:p>
-            <a:r>
-              <a:rPr lang="en-US" b="1" dirty="0">
-                <a:latin typeface="Avenir Next LT Pro" panose="020B0504020202020204" pitchFamily="34" charset="77"/>
-              </a:rPr>
-              <a:t>Code Implementation</a:t>
-            </a:r>
-            <a:endParaRPr lang="en-KR" b="1" dirty="0">
-              <a:latin typeface="Avenir Next LT Pro" panose="020B0504020202020204" pitchFamily="34" charset="77"/>
-            </a:endParaRPr>
-          </a:p>
-        </p:txBody>
-      </p:sp>
-    </p:spTree>
-    <p:extLst>
-      <p:ext uri="{BB962C8B-B14F-4D97-AF65-F5344CB8AC3E}">
-        <p14:creationId xmlns:p14="http://schemas.microsoft.com/office/powerpoint/2010/main" val="97900691"/>
-      </p:ext>
-    </p:extLst>
-  </p:cSld>
-  <p:clrMapOvr>
-    <a:masterClrMapping/>
-  </p:clrMapOvr>
-</p:sld>
-</file>
-
-<file path=ppt/slides/slide7.xml><?xml version="1.0" encoding="utf-8"?>
-<p:sld xmlns:a="http://schemas.openxmlformats.org/drawingml/2006/main" xmlns:r="http://schemas.openxmlformats.org/officeDocument/2006/relationships" xmlns:p="http://schemas.openxmlformats.org/presentationml/2006/main">
-  <p:cSld>
-    <p:spTree>
-      <p:nvGrpSpPr>
-        <p:cNvPr id="1" name="">
-          <a:extLst>
-            <a:ext uri="{FF2B5EF4-FFF2-40B4-BE49-F238E27FC236}">
-              <a16:creationId xmlns:a16="http://schemas.microsoft.com/office/drawing/2014/main" id="{BF97BFD3-3568-80AC-4CBD-E199CB7055BA}"/>
-            </a:ext>
-          </a:extLst>
-        </p:cNvPr>
-        <p:cNvGrpSpPr/>
-        <p:nvPr/>
-      </p:nvGrpSpPr>
-      <p:grpSpPr>
-        <a:xfrm>
-          <a:off x="0" y="0"/>
-          <a:ext cx="0" cy="0"/>
-          <a:chOff x="0" y="0"/>
-          <a:chExt cx="0" cy="0"/>
-        </a:xfrm>
-      </p:grpSpPr>
-      <p:sp>
-        <p:nvSpPr>
-          <p:cNvPr id="4" name="Title 1">
-            <a:extLst>
-              <a:ext uri="{FF2B5EF4-FFF2-40B4-BE49-F238E27FC236}">
-                <a16:creationId xmlns:a16="http://schemas.microsoft.com/office/drawing/2014/main" id="{21FED819-AB7B-7710-5239-277F990B72CB}"/>
-              </a:ext>
-            </a:extLst>
-          </p:cNvPr>
-          <p:cNvSpPr>
-            <a:spLocks noGrp="1"/>
-          </p:cNvSpPr>
-          <p:nvPr>
-            <p:ph type="title"/>
-          </p:nvPr>
-        </p:nvSpPr>
-        <p:spPr>
-          <a:xfrm>
-            <a:off x="838200" y="365125"/>
-            <a:ext cx="10515600" cy="1325563"/>
-          </a:xfrm>
-        </p:spPr>
-        <p:txBody>
-          <a:bodyPr/>
-          <a:lstStyle/>
-          <a:p>
-            <a:r>
-              <a:rPr lang="en-US" b="1" dirty="0">
-                <a:latin typeface="Avenir Next LT Pro" panose="020B0504020202020204" pitchFamily="34" charset="77"/>
-              </a:rPr>
-              <a:t>Code Implementation</a:t>
-            </a:r>
-            <a:endParaRPr lang="en-KR" b="1" dirty="0">
-              <a:latin typeface="Avenir Next LT Pro" panose="020B0504020202020204" pitchFamily="34" charset="77"/>
-            </a:endParaRPr>
-          </a:p>
-        </p:txBody>
-      </p:sp>
-    </p:spTree>
-    <p:extLst>
-      <p:ext uri="{BB962C8B-B14F-4D97-AF65-F5344CB8AC3E}">
-        <p14:creationId xmlns:p14="http://schemas.microsoft.com/office/powerpoint/2010/main" val="423723013"/>
-      </p:ext>
-    </p:extLst>
-  </p:cSld>
-  <p:clrMapOvr>
-    <a:masterClrMapping/>
-  </p:clrMapOvr>
-</p:sld>
-</file>
-
-<file path=ppt/slides/slide8.xml><?xml version="1.0" encoding="utf-8"?>
+<file path=ppt/slides/slide5.xml><?xml version="1.0" encoding="utf-8"?>
 <p:sld xmlns:a="http://schemas.openxmlformats.org/drawingml/2006/main" xmlns:r="http://schemas.openxmlformats.org/officeDocument/2006/relationships" xmlns:p="http://schemas.openxmlformats.org/presentationml/2006/main">
   <p:cSld>
     <p:spTree>
@@ -6584,7 +6528,7 @@
 </p:sld>
 </file>
 
-<file path=ppt/slides/slide9.xml><?xml version="1.0" encoding="utf-8"?>
+<file path=ppt/slides/slide6.xml><?xml version="1.0" encoding="utf-8"?>
 <p:sld xmlns:a="http://schemas.openxmlformats.org/drawingml/2006/main" xmlns:r="http://schemas.openxmlformats.org/officeDocument/2006/relationships" xmlns:p="http://schemas.openxmlformats.org/presentationml/2006/main">
   <p:cSld>
     <p:spTree>
@@ -6592,7 +6536,7 @@
         <p:cNvPr id="1" name="">
           <a:extLst>
             <a:ext uri="{FF2B5EF4-FFF2-40B4-BE49-F238E27FC236}">
-              <a16:creationId xmlns:a16="http://schemas.microsoft.com/office/drawing/2014/main" id="{A0F33974-3058-FD8E-ABE0-7B10E1833833}"/>
+              <a16:creationId xmlns:a16="http://schemas.microsoft.com/office/drawing/2014/main" id="{12324099-33D2-8299-4E88-25F55F8257C2}"/>
             </a:ext>
           </a:extLst>
         </p:cNvPr>
@@ -6609,10 +6553,327 @@
       </p:grpSpPr>
       <p:sp>
         <p:nvSpPr>
-          <p:cNvPr id="8" name="TextBox 7">
-            <a:extLst>
-              <a:ext uri="{FF2B5EF4-FFF2-40B4-BE49-F238E27FC236}">
-                <a16:creationId xmlns:a16="http://schemas.microsoft.com/office/drawing/2014/main" id="{EBA30D0E-D0AD-48C1-C7EB-552439655DC3}"/>
+          <p:cNvPr id="4" name="Title 1">
+            <a:extLst>
+              <a:ext uri="{FF2B5EF4-FFF2-40B4-BE49-F238E27FC236}">
+                <a16:creationId xmlns:a16="http://schemas.microsoft.com/office/drawing/2014/main" id="{3CE6C280-376E-9B32-18BE-776A21EF08AB}"/>
+              </a:ext>
+            </a:extLst>
+          </p:cNvPr>
+          <p:cNvSpPr>
+            <a:spLocks noGrp="1"/>
+          </p:cNvSpPr>
+          <p:nvPr>
+            <p:ph type="title"/>
+          </p:nvPr>
+        </p:nvSpPr>
+        <p:spPr>
+          <a:xfrm>
+            <a:off x="838200" y="365125"/>
+            <a:ext cx="10515600" cy="1325563"/>
+          </a:xfrm>
+        </p:spPr>
+        <p:txBody>
+          <a:bodyPr/>
+          <a:lstStyle/>
+          <a:p>
+            <a:r>
+              <a:rPr lang="en-US" b="1" dirty="0">
+                <a:latin typeface="Avenir Next LT Pro" panose="020B0504020202020204" pitchFamily="34" charset="77"/>
+              </a:rPr>
+              <a:t>Next Plan</a:t>
+            </a:r>
+            <a:endParaRPr lang="en-KR" b="1" dirty="0">
+              <a:latin typeface="Avenir Next LT Pro" panose="020B0504020202020204" pitchFamily="34" charset="77"/>
+            </a:endParaRPr>
+          </a:p>
+        </p:txBody>
+      </p:sp>
+      <p:sp>
+        <p:nvSpPr>
+          <p:cNvPr id="2" name="Rectangle 48">
+            <a:extLst>
+              <a:ext uri="{FF2B5EF4-FFF2-40B4-BE49-F238E27FC236}">
+                <a16:creationId xmlns:a16="http://schemas.microsoft.com/office/drawing/2014/main" id="{3F8EB58C-F722-BD19-2F41-1BF57AD372DE}"/>
+              </a:ext>
+            </a:extLst>
+          </p:cNvPr>
+          <p:cNvSpPr/>
+          <p:nvPr/>
+        </p:nvSpPr>
+        <p:spPr>
+          <a:xfrm>
+            <a:off x="1426390" y="2032601"/>
+            <a:ext cx="5357868" cy="917076"/>
+          </a:xfrm>
+          <a:prstGeom prst="rect">
+            <a:avLst/>
+          </a:prstGeom>
+          <a:noFill/>
+          <a:ln>
+            <a:noFill/>
+          </a:ln>
+        </p:spPr>
+        <p:style>
+          <a:lnRef idx="2">
+            <a:schemeClr val="accent1">
+              <a:shade val="15000"/>
+            </a:schemeClr>
+          </a:lnRef>
+          <a:fillRef idx="1">
+            <a:schemeClr val="accent1"/>
+          </a:fillRef>
+          <a:effectRef idx="0">
+            <a:schemeClr val="accent1"/>
+          </a:effectRef>
+          <a:fontRef idx="minor">
+            <a:schemeClr val="lt1"/>
+          </a:fontRef>
+        </p:style>
+        <p:txBody>
+          <a:bodyPr rtlCol="0" anchor="ctr"/>
+          <a:lstStyle/>
+          <a:p>
+            <a:pPr>
+              <a:lnSpc>
+                <a:spcPct val="150000"/>
+              </a:lnSpc>
+            </a:pPr>
+            <a:r>
+              <a:rPr lang="en-US" sz="2400" b="1" dirty="0">
+                <a:solidFill>
+                  <a:schemeClr val="tx1"/>
+                </a:solidFill>
+                <a:latin typeface="Noto Sans KR" panose="020B0200000000000000" pitchFamily="34" charset="-128"/>
+                <a:ea typeface="Noto Sans KR" panose="020B0200000000000000" pitchFamily="34" charset="-128"/>
+              </a:rPr>
+              <a:t>Apply on various Fitness Activities</a:t>
+            </a:r>
+            <a:endParaRPr lang="en-KR" dirty="0">
+              <a:solidFill>
+                <a:schemeClr val="tx1"/>
+              </a:solidFill>
+              <a:latin typeface="Noto Sans KR" panose="020B0200000000000000" pitchFamily="34" charset="-128"/>
+              <a:ea typeface="Noto Sans KR" panose="020B0200000000000000" pitchFamily="34" charset="-128"/>
+            </a:endParaRPr>
+          </a:p>
+        </p:txBody>
+      </p:sp>
+      <p:sp>
+        <p:nvSpPr>
+          <p:cNvPr id="3" name="Rectangle 48">
+            <a:extLst>
+              <a:ext uri="{FF2B5EF4-FFF2-40B4-BE49-F238E27FC236}">
+                <a16:creationId xmlns:a16="http://schemas.microsoft.com/office/drawing/2014/main" id="{8B1BC571-8A70-8BED-1270-76783EFB8DFC}"/>
+              </a:ext>
+            </a:extLst>
+          </p:cNvPr>
+          <p:cNvSpPr/>
+          <p:nvPr/>
+        </p:nvSpPr>
+        <p:spPr>
+          <a:xfrm>
+            <a:off x="1426390" y="3429000"/>
+            <a:ext cx="5357868" cy="917076"/>
+          </a:xfrm>
+          <a:prstGeom prst="rect">
+            <a:avLst/>
+          </a:prstGeom>
+          <a:noFill/>
+          <a:ln>
+            <a:noFill/>
+          </a:ln>
+        </p:spPr>
+        <p:style>
+          <a:lnRef idx="2">
+            <a:schemeClr val="accent1">
+              <a:shade val="15000"/>
+            </a:schemeClr>
+          </a:lnRef>
+          <a:fillRef idx="1">
+            <a:schemeClr val="accent1"/>
+          </a:fillRef>
+          <a:effectRef idx="0">
+            <a:schemeClr val="accent1"/>
+          </a:effectRef>
+          <a:fontRef idx="minor">
+            <a:schemeClr val="lt1"/>
+          </a:fontRef>
+        </p:style>
+        <p:txBody>
+          <a:bodyPr rtlCol="0" anchor="ctr"/>
+          <a:lstStyle/>
+          <a:p>
+            <a:pPr>
+              <a:lnSpc>
+                <a:spcPct val="150000"/>
+              </a:lnSpc>
+            </a:pPr>
+            <a:r>
+              <a:rPr lang="en-US" sz="2400" b="1" dirty="0">
+                <a:solidFill>
+                  <a:schemeClr val="tx1"/>
+                </a:solidFill>
+                <a:latin typeface="Noto Sans KR" panose="020B0200000000000000" pitchFamily="34" charset="-128"/>
+                <a:ea typeface="Noto Sans KR" panose="020B0200000000000000" pitchFamily="34" charset="-128"/>
+              </a:rPr>
+              <a:t>Implement Basic UI</a:t>
+            </a:r>
+            <a:endParaRPr lang="en-KR" dirty="0">
+              <a:solidFill>
+                <a:schemeClr val="tx1"/>
+              </a:solidFill>
+              <a:latin typeface="Noto Sans KR" panose="020B0200000000000000" pitchFamily="34" charset="-128"/>
+              <a:ea typeface="Noto Sans KR" panose="020B0200000000000000" pitchFamily="34" charset="-128"/>
+            </a:endParaRPr>
+          </a:p>
+        </p:txBody>
+      </p:sp>
+      <p:sp>
+        <p:nvSpPr>
+          <p:cNvPr id="5" name="Rectangle 48">
+            <a:extLst>
+              <a:ext uri="{FF2B5EF4-FFF2-40B4-BE49-F238E27FC236}">
+                <a16:creationId xmlns:a16="http://schemas.microsoft.com/office/drawing/2014/main" id="{3CBCD009-871A-2EE3-F31E-0225B0B281D3}"/>
+              </a:ext>
+            </a:extLst>
+          </p:cNvPr>
+          <p:cNvSpPr/>
+          <p:nvPr/>
+        </p:nvSpPr>
+        <p:spPr>
+          <a:xfrm>
+            <a:off x="1426390" y="4825399"/>
+            <a:ext cx="5357868" cy="917076"/>
+          </a:xfrm>
+          <a:prstGeom prst="rect">
+            <a:avLst/>
+          </a:prstGeom>
+          <a:noFill/>
+          <a:ln>
+            <a:noFill/>
+          </a:ln>
+        </p:spPr>
+        <p:style>
+          <a:lnRef idx="2">
+            <a:schemeClr val="accent1">
+              <a:shade val="15000"/>
+            </a:schemeClr>
+          </a:lnRef>
+          <a:fillRef idx="1">
+            <a:schemeClr val="accent1"/>
+          </a:fillRef>
+          <a:effectRef idx="0">
+            <a:schemeClr val="accent1"/>
+          </a:effectRef>
+          <a:fontRef idx="minor">
+            <a:schemeClr val="lt1"/>
+          </a:fontRef>
+        </p:style>
+        <p:txBody>
+          <a:bodyPr rtlCol="0" anchor="ctr"/>
+          <a:lstStyle/>
+          <a:p>
+            <a:pPr>
+              <a:lnSpc>
+                <a:spcPct val="150000"/>
+              </a:lnSpc>
+            </a:pPr>
+            <a:r>
+              <a:rPr lang="en-US" sz="2400" b="1" dirty="0">
+                <a:solidFill>
+                  <a:schemeClr val="tx1"/>
+                </a:solidFill>
+                <a:latin typeface="Noto Sans KR" panose="020B0200000000000000" pitchFamily="34" charset="-128"/>
+                <a:ea typeface="Noto Sans KR" panose="020B0200000000000000" pitchFamily="34" charset="-128"/>
+              </a:rPr>
+              <a:t>Adding Sound – Rhythm Haptic?</a:t>
+            </a:r>
+            <a:endParaRPr lang="en-KR" dirty="0">
+              <a:solidFill>
+                <a:schemeClr val="tx1"/>
+              </a:solidFill>
+              <a:latin typeface="Noto Sans KR" panose="020B0200000000000000" pitchFamily="34" charset="-128"/>
+              <a:ea typeface="Noto Sans KR" panose="020B0200000000000000" pitchFamily="34" charset="-128"/>
+            </a:endParaRPr>
+          </a:p>
+        </p:txBody>
+      </p:sp>
+    </p:spTree>
+    <p:extLst>
+      <p:ext uri="{BB962C8B-B14F-4D97-AF65-F5344CB8AC3E}">
+        <p14:creationId xmlns:p14="http://schemas.microsoft.com/office/powerpoint/2010/main" val="2350842830"/>
+      </p:ext>
+    </p:extLst>
+  </p:cSld>
+  <p:clrMapOvr>
+    <a:masterClrMapping/>
+  </p:clrMapOvr>
+</p:sld>
+</file>
+
+<file path=ppt/slides/slide7.xml><?xml version="1.0" encoding="utf-8"?>
+<p:sld xmlns:a="http://schemas.openxmlformats.org/drawingml/2006/main" xmlns:r="http://schemas.openxmlformats.org/officeDocument/2006/relationships" xmlns:p="http://schemas.openxmlformats.org/presentationml/2006/main">
+  <p:cSld>
+    <p:spTree>
+      <p:nvGrpSpPr>
+        <p:cNvPr id="1" name="">
+          <a:extLst>
+            <a:ext uri="{FF2B5EF4-FFF2-40B4-BE49-F238E27FC236}">
+              <a16:creationId xmlns:a16="http://schemas.microsoft.com/office/drawing/2014/main" id="{72624A2C-F85A-1B4D-DBF6-6BC514EB33A9}"/>
+            </a:ext>
+          </a:extLst>
+        </p:cNvPr>
+        <p:cNvGrpSpPr/>
+        <p:nvPr/>
+      </p:nvGrpSpPr>
+      <p:grpSpPr>
+        <a:xfrm>
+          <a:off x="0" y="0"/>
+          <a:ext cx="0" cy="0"/>
+          <a:chOff x="0" y="0"/>
+          <a:chExt cx="0" cy="0"/>
+        </a:xfrm>
+      </p:grpSpPr>
+      <p:sp>
+        <p:nvSpPr>
+          <p:cNvPr id="2" name="Title 1">
+            <a:extLst>
+              <a:ext uri="{FF2B5EF4-FFF2-40B4-BE49-F238E27FC236}">
+                <a16:creationId xmlns:a16="http://schemas.microsoft.com/office/drawing/2014/main" id="{53694A58-3A36-2E0B-7BDC-D3C57AA665A4}"/>
+              </a:ext>
+            </a:extLst>
+          </p:cNvPr>
+          <p:cNvSpPr>
+            <a:spLocks noGrp="1"/>
+          </p:cNvSpPr>
+          <p:nvPr>
+            <p:ph type="title"/>
+          </p:nvPr>
+        </p:nvSpPr>
+        <p:spPr/>
+        <p:txBody>
+          <a:bodyPr/>
+          <a:lstStyle/>
+          <a:p>
+            <a:r>
+              <a:rPr lang="en-US" b="1" dirty="0">
+                <a:latin typeface="Avenir Next LT Pro" panose="020B0504020202020204" pitchFamily="34" charset="77"/>
+              </a:rPr>
+              <a:t>Fitness Activities</a:t>
+            </a:r>
+            <a:endParaRPr lang="en-KR" b="1" dirty="0">
+              <a:latin typeface="Avenir Next LT Pro" panose="020B0504020202020204" pitchFamily="34" charset="77"/>
+            </a:endParaRPr>
+          </a:p>
+        </p:txBody>
+      </p:sp>
+      <p:sp>
+        <p:nvSpPr>
+          <p:cNvPr id="3" name="TextBox 2">
+            <a:extLst>
+              <a:ext uri="{FF2B5EF4-FFF2-40B4-BE49-F238E27FC236}">
+                <a16:creationId xmlns:a16="http://schemas.microsoft.com/office/drawing/2014/main" id="{134D251D-1090-EC30-898A-E8E1AEDBB2DA}"/>
               </a:ext>
             </a:extLst>
           </p:cNvPr>
@@ -6621,8 +6882,8 @@
         </p:nvSpPr>
         <p:spPr>
           <a:xfrm>
-            <a:off x="2670048" y="3044279"/>
-            <a:ext cx="6851904" cy="769441"/>
+            <a:off x="2819892" y="2625213"/>
+            <a:ext cx="5049847" cy="369332"/>
           </a:xfrm>
           <a:prstGeom prst="rect">
             <a:avLst/>
@@ -6635,20 +6896,576 @@
           </a:bodyPr>
           <a:lstStyle/>
           <a:p>
-            <a:pPr algn="ctr"/>
-            <a:r>
-              <a:rPr lang="en-KR" sz="4400" b="1" dirty="0">
-                <a:latin typeface="Avenir Next LT Pro" panose="020B0504020202020204" pitchFamily="34" charset="77"/>
-              </a:rPr>
-              <a:t>Thanks for Listening!</a:t>
-            </a:r>
+            <a:r>
+              <a:rPr lang="ko-KR" altLang="en-US" dirty="0"/>
+              <a:t>이때까지 </a:t>
+            </a:r>
+            <a:r>
+              <a:rPr lang="ko-KR" altLang="en-US" dirty="0" err="1"/>
+              <a:t>개발한거</a:t>
+            </a:r>
+            <a:r>
+              <a:rPr lang="ko-KR" altLang="en-US" dirty="0"/>
+              <a:t> 적용 가능한 </a:t>
+            </a:r>
+            <a:r>
+              <a:rPr lang="en-US" altLang="ko-KR" dirty="0"/>
+              <a:t>Activity icons</a:t>
+            </a:r>
+            <a:endParaRPr lang="ko-KR" altLang="en-US" dirty="0"/>
           </a:p>
         </p:txBody>
       </p:sp>
     </p:spTree>
     <p:extLst>
       <p:ext uri="{BB962C8B-B14F-4D97-AF65-F5344CB8AC3E}">
-        <p14:creationId xmlns:p14="http://schemas.microsoft.com/office/powerpoint/2010/main" val="2587172812"/>
+        <p14:creationId xmlns:p14="http://schemas.microsoft.com/office/powerpoint/2010/main" val="148227782"/>
+      </p:ext>
+    </p:extLst>
+  </p:cSld>
+  <p:clrMapOvr>
+    <a:masterClrMapping/>
+  </p:clrMapOvr>
+</p:sld>
+</file>
+
+<file path=ppt/slides/slide8.xml><?xml version="1.0" encoding="utf-8"?>
+<p:sld xmlns:a="http://schemas.openxmlformats.org/drawingml/2006/main" xmlns:r="http://schemas.openxmlformats.org/officeDocument/2006/relationships" xmlns:p="http://schemas.openxmlformats.org/presentationml/2006/main">
+  <p:cSld>
+    <p:spTree>
+      <p:nvGrpSpPr>
+        <p:cNvPr id="1" name="">
+          <a:extLst>
+            <a:ext uri="{FF2B5EF4-FFF2-40B4-BE49-F238E27FC236}">
+              <a16:creationId xmlns:a16="http://schemas.microsoft.com/office/drawing/2014/main" id="{EC746D0F-4896-FD57-0288-267EA0C4106E}"/>
+            </a:ext>
+          </a:extLst>
+        </p:cNvPr>
+        <p:cNvGrpSpPr/>
+        <p:nvPr/>
+      </p:nvGrpSpPr>
+      <p:grpSpPr>
+        <a:xfrm>
+          <a:off x="0" y="0"/>
+          <a:ext cx="0" cy="0"/>
+          <a:chOff x="0" y="0"/>
+          <a:chExt cx="0" cy="0"/>
+        </a:xfrm>
+      </p:grpSpPr>
+      <p:sp>
+        <p:nvSpPr>
+          <p:cNvPr id="2" name="Title 1">
+            <a:extLst>
+              <a:ext uri="{FF2B5EF4-FFF2-40B4-BE49-F238E27FC236}">
+                <a16:creationId xmlns:a16="http://schemas.microsoft.com/office/drawing/2014/main" id="{50F29B50-638B-2276-F847-51546D59FDA5}"/>
+              </a:ext>
+            </a:extLst>
+          </p:cNvPr>
+          <p:cNvSpPr>
+            <a:spLocks noGrp="1"/>
+          </p:cNvSpPr>
+          <p:nvPr>
+            <p:ph type="title"/>
+          </p:nvPr>
+        </p:nvSpPr>
+        <p:spPr/>
+        <p:txBody>
+          <a:bodyPr/>
+          <a:lstStyle/>
+          <a:p>
+            <a:r>
+              <a:rPr lang="en-US" b="1" dirty="0">
+                <a:latin typeface="Avenir Next LT Pro" panose="020B0504020202020204" pitchFamily="34" charset="77"/>
+              </a:rPr>
+              <a:t>Basic</a:t>
+            </a:r>
+            <a:r>
+              <a:rPr lang="ko-KR" altLang="en-US" b="1" dirty="0">
+                <a:latin typeface="Avenir Next LT Pro" panose="020B0504020202020204" pitchFamily="34" charset="77"/>
+              </a:rPr>
+              <a:t> </a:t>
+            </a:r>
+            <a:r>
+              <a:rPr lang="en-US" altLang="ko-KR" b="1" dirty="0">
+                <a:latin typeface="Avenir Next LT Pro" panose="020B0504020202020204" pitchFamily="34" charset="77"/>
+              </a:rPr>
+              <a:t>UI</a:t>
+            </a:r>
+            <a:endParaRPr lang="en-KR" b="1" dirty="0">
+              <a:latin typeface="Avenir Next LT Pro" panose="020B0504020202020204" pitchFamily="34" charset="77"/>
+            </a:endParaRPr>
+          </a:p>
+        </p:txBody>
+      </p:sp>
+      <p:pic>
+        <p:nvPicPr>
+          <p:cNvPr id="12" name="그림 11">
+            <a:extLst>
+              <a:ext uri="{FF2B5EF4-FFF2-40B4-BE49-F238E27FC236}">
+                <a16:creationId xmlns:a16="http://schemas.microsoft.com/office/drawing/2014/main" id="{C99254BA-6F4B-CCB5-C71B-A1D73D78884F}"/>
+              </a:ext>
+            </a:extLst>
+          </p:cNvPr>
+          <p:cNvPicPr>
+            <a:picLocks noChangeAspect="1"/>
+          </p:cNvPicPr>
+          <p:nvPr/>
+        </p:nvPicPr>
+        <p:blipFill>
+          <a:blip r:embed="rId2"/>
+          <a:stretch>
+            <a:fillRect/>
+          </a:stretch>
+        </p:blipFill>
+        <p:spPr>
+          <a:xfrm>
+            <a:off x="1659477" y="1988820"/>
+            <a:ext cx="1696916" cy="3600000"/>
+          </a:xfrm>
+          <a:prstGeom prst="rect">
+            <a:avLst/>
+          </a:prstGeom>
+        </p:spPr>
+      </p:pic>
+      <p:pic>
+        <p:nvPicPr>
+          <p:cNvPr id="14" name="그림 13">
+            <a:extLst>
+              <a:ext uri="{FF2B5EF4-FFF2-40B4-BE49-F238E27FC236}">
+                <a16:creationId xmlns:a16="http://schemas.microsoft.com/office/drawing/2014/main" id="{33A6F238-0829-6232-D3B2-B0F0AEA9A261}"/>
+              </a:ext>
+            </a:extLst>
+          </p:cNvPr>
+          <p:cNvPicPr>
+            <a:picLocks noChangeAspect="1"/>
+          </p:cNvPicPr>
+          <p:nvPr/>
+        </p:nvPicPr>
+        <p:blipFill>
+          <a:blip r:embed="rId3"/>
+          <a:stretch>
+            <a:fillRect/>
+          </a:stretch>
+        </p:blipFill>
+        <p:spPr>
+          <a:xfrm>
+            <a:off x="8817087" y="1988820"/>
+            <a:ext cx="1696916" cy="3600000"/>
+          </a:xfrm>
+          <a:prstGeom prst="rect">
+            <a:avLst/>
+          </a:prstGeom>
+        </p:spPr>
+      </p:pic>
+      <p:pic>
+        <p:nvPicPr>
+          <p:cNvPr id="16" name="그림 15">
+            <a:extLst>
+              <a:ext uri="{FF2B5EF4-FFF2-40B4-BE49-F238E27FC236}">
+                <a16:creationId xmlns:a16="http://schemas.microsoft.com/office/drawing/2014/main" id="{442D3C68-B237-9012-0E0D-BACC2BAA54EB}"/>
+              </a:ext>
+            </a:extLst>
+          </p:cNvPr>
+          <p:cNvPicPr>
+            <a:picLocks noChangeAspect="1"/>
+          </p:cNvPicPr>
+          <p:nvPr/>
+        </p:nvPicPr>
+        <p:blipFill>
+          <a:blip r:embed="rId4"/>
+          <a:stretch>
+            <a:fillRect/>
+          </a:stretch>
+        </p:blipFill>
+        <p:spPr>
+          <a:xfrm>
+            <a:off x="6431217" y="1988820"/>
+            <a:ext cx="1696916" cy="3600000"/>
+          </a:xfrm>
+          <a:prstGeom prst="rect">
+            <a:avLst/>
+          </a:prstGeom>
+        </p:spPr>
+      </p:pic>
+      <p:pic>
+        <p:nvPicPr>
+          <p:cNvPr id="18" name="그림 17">
+            <a:extLst>
+              <a:ext uri="{FF2B5EF4-FFF2-40B4-BE49-F238E27FC236}">
+                <a16:creationId xmlns:a16="http://schemas.microsoft.com/office/drawing/2014/main" id="{AE3DB46D-4068-6677-6813-F41D425AB394}"/>
+              </a:ext>
+            </a:extLst>
+          </p:cNvPr>
+          <p:cNvPicPr>
+            <a:picLocks noChangeAspect="1"/>
+          </p:cNvPicPr>
+          <p:nvPr/>
+        </p:nvPicPr>
+        <p:blipFill>
+          <a:blip r:embed="rId5"/>
+          <a:stretch>
+            <a:fillRect/>
+          </a:stretch>
+        </p:blipFill>
+        <p:spPr>
+          <a:xfrm>
+            <a:off x="4045347" y="1988820"/>
+            <a:ext cx="1696916" cy="3600000"/>
+          </a:xfrm>
+          <a:prstGeom prst="rect">
+            <a:avLst/>
+          </a:prstGeom>
+        </p:spPr>
+      </p:pic>
+    </p:spTree>
+    <p:extLst>
+      <p:ext uri="{BB962C8B-B14F-4D97-AF65-F5344CB8AC3E}">
+        <p14:creationId xmlns:p14="http://schemas.microsoft.com/office/powerpoint/2010/main" val="3293891069"/>
+      </p:ext>
+    </p:extLst>
+  </p:cSld>
+  <p:clrMapOvr>
+    <a:masterClrMapping/>
+  </p:clrMapOvr>
+</p:sld>
+</file>
+
+<file path=ppt/slides/slide9.xml><?xml version="1.0" encoding="utf-8"?>
+<p:sld xmlns:a="http://schemas.openxmlformats.org/drawingml/2006/main" xmlns:r="http://schemas.openxmlformats.org/officeDocument/2006/relationships" xmlns:p="http://schemas.openxmlformats.org/presentationml/2006/main">
+  <p:cSld>
+    <p:spTree>
+      <p:nvGrpSpPr>
+        <p:cNvPr id="1" name="">
+          <a:extLst>
+            <a:ext uri="{FF2B5EF4-FFF2-40B4-BE49-F238E27FC236}">
+              <a16:creationId xmlns:a16="http://schemas.microsoft.com/office/drawing/2014/main" id="{8F35F517-E1AD-4D83-7441-FD8E44D49F6A}"/>
+            </a:ext>
+          </a:extLst>
+        </p:cNvPr>
+        <p:cNvGrpSpPr/>
+        <p:nvPr/>
+      </p:nvGrpSpPr>
+      <p:grpSpPr>
+        <a:xfrm>
+          <a:off x="0" y="0"/>
+          <a:ext cx="0" cy="0"/>
+          <a:chOff x="0" y="0"/>
+          <a:chExt cx="0" cy="0"/>
+        </a:xfrm>
+      </p:grpSpPr>
+      <p:sp>
+        <p:nvSpPr>
+          <p:cNvPr id="2" name="Title 1">
+            <a:extLst>
+              <a:ext uri="{FF2B5EF4-FFF2-40B4-BE49-F238E27FC236}">
+                <a16:creationId xmlns:a16="http://schemas.microsoft.com/office/drawing/2014/main" id="{AAA9076E-9BD7-78D4-3AFC-4BC8667F6D70}"/>
+              </a:ext>
+            </a:extLst>
+          </p:cNvPr>
+          <p:cNvSpPr>
+            <a:spLocks noGrp="1"/>
+          </p:cNvSpPr>
+          <p:nvPr>
+            <p:ph type="title"/>
+          </p:nvPr>
+        </p:nvSpPr>
+        <p:spPr/>
+        <p:txBody>
+          <a:bodyPr/>
+          <a:lstStyle/>
+          <a:p>
+            <a:r>
+              <a:rPr lang="en-US" b="1" dirty="0">
+                <a:latin typeface="Avenir Next LT Pro" panose="020B0504020202020204" pitchFamily="34" charset="77"/>
+              </a:rPr>
+              <a:t>Rhythm Fitness?</a:t>
+            </a:r>
+            <a:endParaRPr lang="en-KR" b="1" dirty="0">
+              <a:latin typeface="Avenir Next LT Pro" panose="020B0504020202020204" pitchFamily="34" charset="77"/>
+            </a:endParaRPr>
+          </a:p>
+        </p:txBody>
+      </p:sp>
+      <p:grpSp>
+        <p:nvGrpSpPr>
+          <p:cNvPr id="3" name="Group 8">
+            <a:extLst>
+              <a:ext uri="{FF2B5EF4-FFF2-40B4-BE49-F238E27FC236}">
+                <a16:creationId xmlns:a16="http://schemas.microsoft.com/office/drawing/2014/main" id="{57EE9961-D03B-698A-1471-EC6CF3216CBE}"/>
+              </a:ext>
+            </a:extLst>
+          </p:cNvPr>
+          <p:cNvGrpSpPr/>
+          <p:nvPr/>
+        </p:nvGrpSpPr>
+        <p:grpSpPr>
+          <a:xfrm>
+            <a:off x="1806388" y="1480835"/>
+            <a:ext cx="3835117" cy="5209970"/>
+            <a:chOff x="846425" y="1648030"/>
+            <a:chExt cx="3835117" cy="5209970"/>
+          </a:xfrm>
+        </p:grpSpPr>
+        <p:pic>
+          <p:nvPicPr>
+            <p:cNvPr id="4" name="Picture 2" descr="Rhythm Heaven Fever">
+              <a:extLst>
+                <a:ext uri="{FF2B5EF4-FFF2-40B4-BE49-F238E27FC236}">
+                  <a16:creationId xmlns:a16="http://schemas.microsoft.com/office/drawing/2014/main" id="{66F22B09-5CF3-3257-D033-F64824834682}"/>
+                </a:ext>
+              </a:extLst>
+            </p:cNvPr>
+            <p:cNvPicPr>
+              <a:picLocks noChangeAspect="1" noChangeArrowheads="1"/>
+            </p:cNvPicPr>
+            <p:nvPr/>
+          </p:nvPicPr>
+          <p:blipFill>
+            <a:blip r:embed="rId2">
+              <a:extLst>
+                <a:ext uri="{28A0092B-C50C-407E-A947-70E740481C1C}">
+                  <a14:useLocalDpi xmlns:a14="http://schemas.microsoft.com/office/drawing/2010/main" val="0"/>
+                </a:ext>
+              </a:extLst>
+            </a:blip>
+            <a:srcRect/>
+            <a:stretch>
+              <a:fillRect/>
+            </a:stretch>
+          </p:blipFill>
+          <p:spPr bwMode="auto">
+            <a:xfrm>
+              <a:off x="846425" y="1648030"/>
+              <a:ext cx="3835117" cy="5209970"/>
+            </a:xfrm>
+            <a:prstGeom prst="rect">
+              <a:avLst/>
+            </a:prstGeom>
+            <a:noFill/>
+            <a:extLst>
+              <a:ext uri="{909E8E84-426E-40DD-AFC4-6F175D3DCCD1}">
+                <a14:hiddenFill xmlns:a14="http://schemas.microsoft.com/office/drawing/2010/main">
+                  <a:solidFill>
+                    <a:srgbClr val="FFFFFF"/>
+                  </a:solidFill>
+                </a14:hiddenFill>
+              </a:ext>
+            </a:extLst>
+          </p:spPr>
+        </p:pic>
+        <p:sp>
+          <p:nvSpPr>
+            <p:cNvPr id="5" name="Rectangle 7">
+              <a:extLst>
+                <a:ext uri="{FF2B5EF4-FFF2-40B4-BE49-F238E27FC236}">
+                  <a16:creationId xmlns:a16="http://schemas.microsoft.com/office/drawing/2014/main" id="{80CA8E3C-DB5D-672D-535B-AA070EC0ABEC}"/>
+                </a:ext>
+              </a:extLst>
+            </p:cNvPr>
+            <p:cNvSpPr/>
+            <p:nvPr/>
+          </p:nvSpPr>
+          <p:spPr>
+            <a:xfrm rot="21323285">
+              <a:off x="3156594" y="2637184"/>
+              <a:ext cx="1013070" cy="582569"/>
+            </a:xfrm>
+            <a:prstGeom prst="rect">
+              <a:avLst/>
+            </a:prstGeom>
+            <a:solidFill>
+              <a:schemeClr val="tx1"/>
+            </a:solidFill>
+            <a:ln>
+              <a:noFill/>
+            </a:ln>
+          </p:spPr>
+          <p:style>
+            <a:lnRef idx="2">
+              <a:schemeClr val="accent1">
+                <a:shade val="15000"/>
+              </a:schemeClr>
+            </a:lnRef>
+            <a:fillRef idx="1">
+              <a:schemeClr val="accent1"/>
+            </a:fillRef>
+            <a:effectRef idx="0">
+              <a:schemeClr val="accent1"/>
+            </a:effectRef>
+            <a:fontRef idx="minor">
+              <a:schemeClr val="lt1"/>
+            </a:fontRef>
+          </p:style>
+          <p:txBody>
+            <a:bodyPr lIns="0" tIns="0" rIns="0" bIns="0" rtlCol="0" anchor="ctr"/>
+            <a:lstStyle/>
+            <a:p>
+              <a:r>
+                <a:rPr lang="en-US" sz="3200" b="1" dirty="0">
+                  <a:solidFill>
+                    <a:srgbClr val="FFFF00"/>
+                  </a:solidFill>
+                  <a:latin typeface="Abadi MT Condensed Extra Bold" panose="020B0306030101010103" pitchFamily="34" charset="77"/>
+                  <a:ea typeface="Noto Sans KR" panose="020B0200000000000000" pitchFamily="34" charset="-128"/>
+                </a:rPr>
+                <a:t>APTIC</a:t>
+              </a:r>
+              <a:endParaRPr lang="en-KR" sz="3200" b="1" dirty="0">
+                <a:solidFill>
+                  <a:srgbClr val="FFFF00"/>
+                </a:solidFill>
+                <a:latin typeface="Abadi MT Condensed Extra Bold" panose="020B0306030101010103" pitchFamily="34" charset="77"/>
+                <a:ea typeface="Noto Sans KR" panose="020B0200000000000000" pitchFamily="34" charset="-128"/>
+              </a:endParaRPr>
+            </a:p>
+          </p:txBody>
+        </p:sp>
+      </p:grpSp>
+      <p:grpSp>
+        <p:nvGrpSpPr>
+          <p:cNvPr id="6" name="Group 11">
+            <a:extLst>
+              <a:ext uri="{FF2B5EF4-FFF2-40B4-BE49-F238E27FC236}">
+                <a16:creationId xmlns:a16="http://schemas.microsoft.com/office/drawing/2014/main" id="{FB0AEFCB-F1A0-7100-6E89-ED0C6335E6E2}"/>
+              </a:ext>
+            </a:extLst>
+          </p:cNvPr>
+          <p:cNvGrpSpPr/>
+          <p:nvPr/>
+        </p:nvGrpSpPr>
+        <p:grpSpPr>
+          <a:xfrm>
+            <a:off x="6805346" y="1774129"/>
+            <a:ext cx="3393937" cy="4600670"/>
+            <a:chOff x="6542914" y="2077943"/>
+            <a:chExt cx="3393937" cy="4600670"/>
+          </a:xfrm>
+        </p:grpSpPr>
+        <p:pic>
+          <p:nvPicPr>
+            <p:cNvPr id="7" name="Picture 9">
+              <a:extLst>
+                <a:ext uri="{FF2B5EF4-FFF2-40B4-BE49-F238E27FC236}">
+                  <a16:creationId xmlns:a16="http://schemas.microsoft.com/office/drawing/2014/main" id="{890CE321-638E-2EC4-65D2-E84DFCA311B4}"/>
+                </a:ext>
+              </a:extLst>
+            </p:cNvPr>
+            <p:cNvPicPr>
+              <a:picLocks noChangeAspect="1"/>
+            </p:cNvPicPr>
+            <p:nvPr/>
+          </p:nvPicPr>
+          <p:blipFill>
+            <a:blip r:embed="rId3"/>
+            <a:stretch>
+              <a:fillRect/>
+            </a:stretch>
+          </p:blipFill>
+          <p:spPr>
+            <a:xfrm>
+              <a:off x="6542914" y="2077943"/>
+              <a:ext cx="3393937" cy="4600670"/>
+            </a:xfrm>
+            <a:prstGeom prst="rect">
+              <a:avLst/>
+            </a:prstGeom>
+          </p:spPr>
+        </p:pic>
+        <p:pic>
+          <p:nvPicPr>
+            <p:cNvPr id="8" name="Graphic 10" descr="Smart Phone with solid fill">
+              <a:extLst>
+                <a:ext uri="{FF2B5EF4-FFF2-40B4-BE49-F238E27FC236}">
+                  <a16:creationId xmlns:a16="http://schemas.microsoft.com/office/drawing/2014/main" id="{10C14350-FFC0-46DE-5058-25BE7D9A06F0}"/>
+                </a:ext>
+              </a:extLst>
+            </p:cNvPr>
+            <p:cNvPicPr>
+              <a:picLocks noChangeAspect="1"/>
+            </p:cNvPicPr>
+            <p:nvPr/>
+          </p:nvPicPr>
+          <p:blipFill>
+            <a:blip r:embed="rId4">
+              <a:extLst>
+                <a:ext uri="{96DAC541-7B7A-43D3-8B79-37D633B846F1}">
+                  <asvg:svgBlip xmlns:asvg="http://schemas.microsoft.com/office/drawing/2016/SVG/main" r:embed="rId5"/>
+                </a:ext>
+              </a:extLst>
+            </a:blip>
+            <a:stretch>
+              <a:fillRect/>
+            </a:stretch>
+          </p:blipFill>
+          <p:spPr>
+            <a:xfrm rot="19189882">
+              <a:off x="7365337" y="2215618"/>
+              <a:ext cx="849988" cy="849988"/>
+            </a:xfrm>
+            <a:prstGeom prst="rect">
+              <a:avLst/>
+            </a:prstGeom>
+          </p:spPr>
+        </p:pic>
+      </p:grpSp>
+      <p:sp>
+        <p:nvSpPr>
+          <p:cNvPr id="9" name="Arc 16">
+            <a:extLst>
+              <a:ext uri="{FF2B5EF4-FFF2-40B4-BE49-F238E27FC236}">
+                <a16:creationId xmlns:a16="http://schemas.microsoft.com/office/drawing/2014/main" id="{DF1BE1F7-D7F4-76DA-5866-86EE01DB382C}"/>
+              </a:ext>
+            </a:extLst>
+          </p:cNvPr>
+          <p:cNvSpPr/>
+          <p:nvPr/>
+        </p:nvSpPr>
+        <p:spPr>
+          <a:xfrm>
+            <a:off x="6805346" y="2336798"/>
+            <a:ext cx="3580266" cy="3580266"/>
+          </a:xfrm>
+          <a:prstGeom prst="arc">
+            <a:avLst>
+              <a:gd name="adj1" fmla="val 16200000"/>
+              <a:gd name="adj2" fmla="val 2484093"/>
+            </a:avLst>
+          </a:prstGeom>
+          <a:ln w="38100">
+            <a:solidFill>
+              <a:srgbClr val="FF0000"/>
+            </a:solidFill>
+            <a:headEnd type="arrow" w="med" len="med"/>
+            <a:tailEnd type="arrow" w="med" len="med"/>
+          </a:ln>
+        </p:spPr>
+        <p:style>
+          <a:lnRef idx="2">
+            <a:schemeClr val="accent1"/>
+          </a:lnRef>
+          <a:fillRef idx="0">
+            <a:schemeClr val="accent1"/>
+          </a:fillRef>
+          <a:effectRef idx="1">
+            <a:schemeClr val="accent1"/>
+          </a:effectRef>
+          <a:fontRef idx="minor">
+            <a:schemeClr val="tx1"/>
+          </a:fontRef>
+        </p:style>
+        <p:txBody>
+          <a:bodyPr rtlCol="0" anchor="ctr"/>
+          <a:lstStyle/>
+          <a:p>
+            <a:pPr algn="ctr"/>
+            <a:endParaRPr lang="en-KR" dirty="0"/>
+          </a:p>
+        </p:txBody>
+      </p:sp>
+    </p:spTree>
+    <p:extLst>
+      <p:ext uri="{BB962C8B-B14F-4D97-AF65-F5344CB8AC3E}">
+        <p14:creationId xmlns:p14="http://schemas.microsoft.com/office/powerpoint/2010/main" val="1173906709"/>
       </p:ext>
     </p:extLst>
   </p:cSld>

</xml_diff>